<commit_message>
fixed things because people love complaining
</commit_message>
<xml_diff>
--- a/IDPA/Snow Camp 1.pptx
+++ b/IDPA/Snow Camp 1.pptx
@@ -335,7 +335,7 @@
               <a:pPr>
                 <a:defRPr/>
               </a:pPr>
-              <a:t>11/25/19</a:t>
+              <a:t>11/27/19</a:t>
             </a:fld>
             <a:endParaRPr lang="en-US"/>
           </a:p>
@@ -4236,7 +4236,7 @@
           <p:nvPr>
             <p:extLst>
               <p:ext uri="{D42A27DB-BD31-4B8C-83A1-F6EECF244321}">
-                <p14:modId xmlns:p14="http://schemas.microsoft.com/office/powerpoint/2010/main" val="1349749364"/>
+                <p14:modId xmlns:p14="http://schemas.microsoft.com/office/powerpoint/2010/main" val="3136465409"/>
               </p:ext>
             </p:extLst>
           </p:nvPr>
@@ -5054,7 +5054,37 @@
                           <a:ea typeface="ＭＳ Ｐゴシック" pitchFamily="-112" charset="-128"/>
                           <a:cs typeface="Times New Roman" pitchFamily="-112" charset="0"/>
                         </a:rPr>
-                        <a:t>SCORED HITS:        Only 2</a:t>
+                        <a:t>SCORED HITS</a:t>
+                      </a:r>
+                      <a:r>
+                        <a:rPr kumimoji="0" lang="en-US" sz="1100" b="1" i="0" u="none" strike="noStrike" cap="none" normalizeH="0" baseline="0">
+                          <a:ln>
+                            <a:noFill/>
+                          </a:ln>
+                          <a:solidFill>
+                            <a:schemeClr val="tx1"/>
+                          </a:solidFill>
+                          <a:effectLst/>
+                          <a:latin typeface="Arial" charset="0"/>
+                          <a:ea typeface="ＭＳ Ｐゴシック" pitchFamily="-112" charset="-128"/>
+                          <a:cs typeface="Times New Roman" pitchFamily="-112" charset="0"/>
+                        </a:rPr>
+                        <a:t>:        Best </a:t>
+                      </a:r>
+                      <a:r>
+                        <a:rPr kumimoji="0" lang="en-US" sz="1100" b="1" i="0" u="none" strike="noStrike" cap="none" normalizeH="0" baseline="0" dirty="0">
+                          <a:ln>
+                            <a:noFill/>
+                          </a:ln>
+                          <a:solidFill>
+                            <a:schemeClr val="tx1"/>
+                          </a:solidFill>
+                          <a:effectLst/>
+                          <a:latin typeface="Arial" charset="0"/>
+                          <a:ea typeface="ＭＳ Ｐゴシック" pitchFamily="-112" charset="-128"/>
+                          <a:cs typeface="Times New Roman" pitchFamily="-112" charset="0"/>
+                        </a:rPr>
+                        <a:t>2</a:t>
                       </a:r>
                     </a:p>
                     <a:p>

</xml_diff>